<commit_message>
changed Videotext, fixed small typos in presentation
</commit_message>
<xml_diff>
--- a/GITnoAnim.pptx
+++ b/GITnoAnim.pptx
@@ -223,7 +223,7 @@
           <a:p>
             <a:fld id="{612997BE-8F1F-454B-AFC5-13E8512A60F3}" type="datetimeFigureOut">
               <a:rPr lang="en-DE" smtClean="0"/>
-              <a:t>10/01/2021</a:t>
+              <a:t>12/01/2021</a:t>
             </a:fld>
             <a:endParaRPr lang="en-DE"/>
           </a:p>
@@ -3684,7 +3684,7 @@
           <a:p>
             <a:fld id="{08743522-27C6-4791-ABB3-161725402031}" type="datetimeFigureOut">
               <a:rPr lang="de-DE" smtClean="0"/>
-              <a:t>10.01.2021</a:t>
+              <a:t>12.01.2021</a:t>
             </a:fld>
             <a:endParaRPr lang="de-DE"/>
           </a:p>
@@ -3882,7 +3882,7 @@
           <a:p>
             <a:fld id="{08743522-27C6-4791-ABB3-161725402031}" type="datetimeFigureOut">
               <a:rPr lang="de-DE" smtClean="0"/>
-              <a:t>10.01.2021</a:t>
+              <a:t>12.01.2021</a:t>
             </a:fld>
             <a:endParaRPr lang="de-DE"/>
           </a:p>
@@ -4090,7 +4090,7 @@
           <a:p>
             <a:fld id="{08743522-27C6-4791-ABB3-161725402031}" type="datetimeFigureOut">
               <a:rPr lang="de-DE" smtClean="0"/>
-              <a:t>10.01.2021</a:t>
+              <a:t>12.01.2021</a:t>
             </a:fld>
             <a:endParaRPr lang="de-DE"/>
           </a:p>
@@ -4431,7 +4431,7 @@
           <a:p>
             <a:fld id="{08743522-27C6-4791-ABB3-161725402031}" type="datetimeFigureOut">
               <a:rPr lang="de-DE" smtClean="0"/>
-              <a:t>10.01.2021</a:t>
+              <a:t>12.01.2021</a:t>
             </a:fld>
             <a:endParaRPr lang="de-DE"/>
           </a:p>
@@ -4706,7 +4706,7 @@
           <a:p>
             <a:fld id="{08743522-27C6-4791-ABB3-161725402031}" type="datetimeFigureOut">
               <a:rPr lang="de-DE" smtClean="0"/>
-              <a:t>10.01.2021</a:t>
+              <a:t>12.01.2021</a:t>
             </a:fld>
             <a:endParaRPr lang="de-DE"/>
           </a:p>
@@ -4971,7 +4971,7 @@
           <a:p>
             <a:fld id="{08743522-27C6-4791-ABB3-161725402031}" type="datetimeFigureOut">
               <a:rPr lang="de-DE" smtClean="0"/>
-              <a:t>10.01.2021</a:t>
+              <a:t>12.01.2021</a:t>
             </a:fld>
             <a:endParaRPr lang="de-DE"/>
           </a:p>
@@ -5383,7 +5383,7 @@
           <a:p>
             <a:fld id="{08743522-27C6-4791-ABB3-161725402031}" type="datetimeFigureOut">
               <a:rPr lang="de-DE" smtClean="0"/>
-              <a:t>10.01.2021</a:t>
+              <a:t>12.01.2021</a:t>
             </a:fld>
             <a:endParaRPr lang="de-DE"/>
           </a:p>
@@ -5524,7 +5524,7 @@
           <a:p>
             <a:fld id="{08743522-27C6-4791-ABB3-161725402031}" type="datetimeFigureOut">
               <a:rPr lang="de-DE" smtClean="0"/>
-              <a:t>10.01.2021</a:t>
+              <a:t>12.01.2021</a:t>
             </a:fld>
             <a:endParaRPr lang="de-DE"/>
           </a:p>
@@ -5637,7 +5637,7 @@
           <a:p>
             <a:fld id="{08743522-27C6-4791-ABB3-161725402031}" type="datetimeFigureOut">
               <a:rPr lang="de-DE" smtClean="0"/>
-              <a:t>10.01.2021</a:t>
+              <a:t>12.01.2021</a:t>
             </a:fld>
             <a:endParaRPr lang="de-DE"/>
           </a:p>
@@ -5948,7 +5948,7 @@
           <a:p>
             <a:fld id="{08743522-27C6-4791-ABB3-161725402031}" type="datetimeFigureOut">
               <a:rPr lang="de-DE" smtClean="0"/>
-              <a:t>10.01.2021</a:t>
+              <a:t>12.01.2021</a:t>
             </a:fld>
             <a:endParaRPr lang="de-DE"/>
           </a:p>
@@ -6236,7 +6236,7 @@
           <a:p>
             <a:fld id="{08743522-27C6-4791-ABB3-161725402031}" type="datetimeFigureOut">
               <a:rPr lang="de-DE" smtClean="0"/>
-              <a:t>10.01.2021</a:t>
+              <a:t>12.01.2021</a:t>
             </a:fld>
             <a:endParaRPr lang="de-DE"/>
           </a:p>
@@ -6477,7 +6477,7 @@
           <a:p>
             <a:fld id="{08743522-27C6-4791-ABB3-161725402031}" type="datetimeFigureOut">
               <a:rPr lang="de-DE" smtClean="0"/>
-              <a:t>10.01.2021</a:t>
+              <a:t>12.01.2021</a:t>
             </a:fld>
             <a:endParaRPr lang="de-DE"/>
           </a:p>
@@ -14676,7 +14676,7 @@
             <a:pPr algn="ctr"/>
             <a:r>
               <a:rPr lang="de-DE" sz="6000" dirty="0"/>
-              <a:t>Ideal für Agile Vorgehensmodelle</a:t>
+              <a:t>Ideal für agile Vorgehensmodelle</a:t>
             </a:r>
           </a:p>
           <a:p>
@@ -20794,7 +20794,7 @@
             <a:pPr algn="ctr"/>
             <a:r>
               <a:rPr lang="de-DE" sz="4000" dirty="0"/>
-              <a:t>Weitgehende Hilfen von </a:t>
+              <a:t>Keine automatische Lösung durch </a:t>
             </a:r>
             <a:r>
               <a:rPr lang="de-DE" sz="4000" dirty="0" err="1"/>
@@ -39076,7 +39076,179 @@
         <p:spPr>
           <a:xfrm>
             <a:off x="1990099" y="4038079"/>
-            <a:ext cx="3639481" cy="2246769"/>
+            <a:ext cx="4105901" cy="2677656"/>
+          </a:xfrm>
+          <a:prstGeom prst="rect">
+            <a:avLst/>
+          </a:prstGeom>
+          <a:noFill/>
+        </p:spPr>
+        <p:txBody>
+          <a:bodyPr wrap="square" rtlCol="0">
+            <a:spAutoFit/>
+          </a:bodyPr>
+          <a:lstStyle/>
+          <a:p>
+            <a:r>
+              <a:rPr lang="de-DE" sz="2800" b="1" dirty="0">
+                <a:solidFill>
+                  <a:schemeClr val="bg1">
+                    <a:lumMod val="50000"/>
+                  </a:schemeClr>
+                </a:solidFill>
+              </a:rPr>
+              <a:t>-</a:t>
+            </a:r>
+            <a:r>
+              <a:rPr lang="de-DE" sz="2800" b="1" dirty="0" err="1">
+                <a:solidFill>
+                  <a:schemeClr val="bg1">
+                    <a:lumMod val="50000"/>
+                  </a:schemeClr>
+                </a:solidFill>
+              </a:rPr>
+              <a:t>git</a:t>
+            </a:r>
+            <a:r>
+              <a:rPr lang="de-DE" sz="2800" b="1" dirty="0">
+                <a:solidFill>
+                  <a:schemeClr val="bg1">
+                    <a:lumMod val="50000"/>
+                  </a:schemeClr>
+                </a:solidFill>
+              </a:rPr>
+              <a:t> pull </a:t>
+            </a:r>
+          </a:p>
+          <a:p>
+            <a:endParaRPr lang="de-DE" sz="2800" b="1" dirty="0">
+              <a:solidFill>
+                <a:schemeClr val="bg1">
+                  <a:lumMod val="50000"/>
+                </a:schemeClr>
+              </a:solidFill>
+            </a:endParaRPr>
+          </a:p>
+          <a:p>
+            <a:r>
+              <a:rPr lang="de-DE" sz="2800" b="1" dirty="0">
+                <a:solidFill>
+                  <a:schemeClr val="bg1">
+                    <a:lumMod val="50000"/>
+                  </a:schemeClr>
+                </a:solidFill>
+              </a:rPr>
+              <a:t>-</a:t>
+            </a:r>
+            <a:r>
+              <a:rPr lang="de-DE" sz="2800" b="1" dirty="0" err="1">
+                <a:solidFill>
+                  <a:schemeClr val="bg1">
+                    <a:lumMod val="50000"/>
+                  </a:schemeClr>
+                </a:solidFill>
+              </a:rPr>
+              <a:t>edit</a:t>
+            </a:r>
+            <a:r>
+              <a:rPr lang="de-DE" sz="2800" b="1" dirty="0">
+                <a:solidFill>
+                  <a:schemeClr val="bg1">
+                    <a:lumMod val="50000"/>
+                  </a:schemeClr>
+                </a:solidFill>
+              </a:rPr>
+              <a:t> MyClass.java</a:t>
+            </a:r>
+          </a:p>
+          <a:p>
+            <a:endParaRPr lang="de-DE" sz="2800" b="1" dirty="0">
+              <a:solidFill>
+                <a:schemeClr val="bg1">
+                  <a:lumMod val="50000"/>
+                </a:schemeClr>
+              </a:solidFill>
+            </a:endParaRPr>
+          </a:p>
+          <a:p>
+            <a:r>
+              <a:rPr lang="de-DE" sz="2800" b="1" dirty="0">
+                <a:solidFill>
+                  <a:schemeClr val="bg1">
+                    <a:lumMod val="50000"/>
+                  </a:schemeClr>
+                </a:solidFill>
+              </a:rPr>
+              <a:t>-</a:t>
+            </a:r>
+            <a:r>
+              <a:rPr lang="de-DE" sz="2800" b="1" dirty="0" err="1">
+                <a:solidFill>
+                  <a:schemeClr val="bg1">
+                    <a:lumMod val="50000"/>
+                  </a:schemeClr>
+                </a:solidFill>
+              </a:rPr>
+              <a:t>git</a:t>
+            </a:r>
+            <a:r>
+              <a:rPr lang="de-DE" sz="2800" b="1" dirty="0">
+                <a:solidFill>
+                  <a:schemeClr val="bg1">
+                    <a:lumMod val="50000"/>
+                  </a:schemeClr>
+                </a:solidFill>
+              </a:rPr>
+              <a:t> </a:t>
+            </a:r>
+            <a:r>
+              <a:rPr lang="de-DE" sz="2800" b="1" dirty="0" err="1">
+                <a:solidFill>
+                  <a:schemeClr val="bg1">
+                    <a:lumMod val="50000"/>
+                  </a:schemeClr>
+                </a:solidFill>
+              </a:rPr>
+              <a:t>add</a:t>
+            </a:r>
+            <a:r>
+              <a:rPr lang="de-DE" sz="2800" b="1" dirty="0">
+                <a:solidFill>
+                  <a:schemeClr val="bg1">
+                    <a:lumMod val="50000"/>
+                  </a:schemeClr>
+                </a:solidFill>
+              </a:rPr>
+              <a:t> MyClass.java</a:t>
+            </a:r>
+          </a:p>
+          <a:p>
+            <a:endParaRPr lang="de-DE" sz="2800" b="1" dirty="0">
+              <a:solidFill>
+                <a:schemeClr val="bg1">
+                  <a:lumMod val="50000"/>
+                </a:schemeClr>
+              </a:solidFill>
+            </a:endParaRPr>
+          </a:p>
+        </p:txBody>
+      </p:sp>
+      <p:sp>
+        <p:nvSpPr>
+          <p:cNvPr id="35" name="Textfeld 34">
+            <a:extLst>
+              <a:ext uri="{FF2B5EF4-FFF2-40B4-BE49-F238E27FC236}">
+                <a16:creationId xmlns:a16="http://schemas.microsoft.com/office/drawing/2014/main" id="{EB22F8E0-DE62-45BC-AB71-1E12ECD30D70}"/>
+              </a:ext>
+            </a:extLst>
+          </p:cNvPr>
+          <p:cNvSpPr txBox="1"/>
+          <p:nvPr/>
+        </p:nvSpPr>
+        <p:spPr>
+          <a:xfrm>
+            <a:off x="6264471" y="4038079"/>
+            <a:ext cx="4105901" cy="1384995"/>
           </a:xfrm>
           <a:prstGeom prst="rect">
             <a:avLst/>
@@ -39129,24 +39301,6 @@
               </a:rPr>
               <a:t>commit</a:t>
             </a:r>
-            <a:endParaRPr lang="de-DE" sz="2800" b="1" dirty="0">
-              <a:solidFill>
-                <a:schemeClr val="bg1">
-                  <a:lumMod val="50000"/>
-                </a:schemeClr>
-              </a:solidFill>
-            </a:endParaRPr>
-          </a:p>
-          <a:p>
-            <a:endParaRPr lang="de-DE" sz="2800" b="1" dirty="0">
-              <a:solidFill>
-                <a:schemeClr val="bg1">
-                  <a:lumMod val="50000"/>
-                </a:schemeClr>
-              </a:solidFill>
-            </a:endParaRPr>
-          </a:p>
-          <a:p>
             <a:r>
               <a:rPr lang="de-DE" sz="2800" b="1" dirty="0">
                 <a:solidFill>
@@ -39155,7 +39309,7 @@
                   </a:schemeClr>
                 </a:solidFill>
               </a:rPr>
-              <a:t>-</a:t>
+              <a:t> –m „</a:t>
             </a:r>
             <a:r>
               <a:rPr lang="de-DE" sz="2800" b="1" dirty="0" err="1">
@@ -39165,7 +39319,7 @@
                   </a:schemeClr>
                 </a:solidFill>
               </a:rPr>
-              <a:t>git</a:t>
+              <a:t>message</a:t>
             </a:r>
             <a:r>
               <a:rPr lang="de-DE" sz="2800" b="1" dirty="0">
@@ -39175,18 +39329,10 @@
                   </a:schemeClr>
                 </a:solidFill>
               </a:rPr>
-              <a:t> </a:t>
+              <a:t>“</a:t>
             </a:r>
-            <a:r>
-              <a:rPr lang="de-DE" sz="2800" b="1" dirty="0" err="1">
-                <a:solidFill>
-                  <a:schemeClr val="bg1">
-                    <a:lumMod val="50000"/>
-                  </a:schemeClr>
-                </a:solidFill>
-              </a:rPr>
-              <a:t>add</a:t>
-            </a:r>
+          </a:p>
+          <a:p>
             <a:endParaRPr lang="de-DE" sz="2800" b="1" dirty="0">
               <a:solidFill>
                 <a:schemeClr val="bg1">
@@ -39195,93 +39341,6 @@
               </a:solidFill>
             </a:endParaRPr>
           </a:p>
-          <a:p>
-            <a:endParaRPr lang="de-DE" sz="2800" b="1" dirty="0">
-              <a:solidFill>
-                <a:schemeClr val="bg1">
-                  <a:lumMod val="50000"/>
-                </a:schemeClr>
-              </a:solidFill>
-            </a:endParaRPr>
-          </a:p>
-          <a:p>
-            <a:r>
-              <a:rPr lang="de-DE" sz="2800" b="1" dirty="0">
-                <a:solidFill>
-                  <a:schemeClr val="bg1">
-                    <a:lumMod val="50000"/>
-                  </a:schemeClr>
-                </a:solidFill>
-              </a:rPr>
-              <a:t>-</a:t>
-            </a:r>
-            <a:r>
-              <a:rPr lang="de-DE" sz="2800" b="1" dirty="0" err="1">
-                <a:solidFill>
-                  <a:schemeClr val="bg1">
-                    <a:lumMod val="50000"/>
-                  </a:schemeClr>
-                </a:solidFill>
-              </a:rPr>
-              <a:t>git</a:t>
-            </a:r>
-            <a:r>
-              <a:rPr lang="de-DE" sz="2800" b="1" dirty="0">
-                <a:solidFill>
-                  <a:schemeClr val="bg1">
-                    <a:lumMod val="50000"/>
-                  </a:schemeClr>
-                </a:solidFill>
-              </a:rPr>
-              <a:t> </a:t>
-            </a:r>
-            <a:r>
-              <a:rPr lang="de-DE" sz="2800" b="1" dirty="0" err="1">
-                <a:solidFill>
-                  <a:schemeClr val="bg1">
-                    <a:lumMod val="50000"/>
-                  </a:schemeClr>
-                </a:solidFill>
-              </a:rPr>
-              <a:t>rm</a:t>
-            </a:r>
-            <a:endParaRPr lang="de-DE" sz="2800" b="1" dirty="0">
-              <a:solidFill>
-                <a:schemeClr val="bg1">
-                  <a:lumMod val="50000"/>
-                </a:schemeClr>
-              </a:solidFill>
-            </a:endParaRPr>
-          </a:p>
-        </p:txBody>
-      </p:sp>
-      <p:sp>
-        <p:nvSpPr>
-          <p:cNvPr id="35" name="Textfeld 34">
-            <a:extLst>
-              <a:ext uri="{FF2B5EF4-FFF2-40B4-BE49-F238E27FC236}">
-                <a16:creationId xmlns:a16="http://schemas.microsoft.com/office/drawing/2014/main" id="{EB22F8E0-DE62-45BC-AB71-1E12ECD30D70}"/>
-              </a:ext>
-            </a:extLst>
-          </p:cNvPr>
-          <p:cNvSpPr txBox="1"/>
-          <p:nvPr/>
-        </p:nvSpPr>
-        <p:spPr>
-          <a:xfrm>
-            <a:off x="6005748" y="4038079"/>
-            <a:ext cx="3639481" cy="2246769"/>
-          </a:xfrm>
-          <a:prstGeom prst="rect">
-            <a:avLst/>
-          </a:prstGeom>
-          <a:noFill/>
-        </p:spPr>
-        <p:txBody>
-          <a:bodyPr wrap="square" rtlCol="0">
-            <a:spAutoFit/>
-          </a:bodyPr>
-          <a:lstStyle/>
           <a:p>
             <a:r>
               <a:rPr lang="de-DE" sz="2800" b="1" dirty="0">
@@ -39313,105 +39372,6 @@
               </a:rPr>
               <a:t> push</a:t>
             </a:r>
-          </a:p>
-          <a:p>
-            <a:endParaRPr lang="de-DE" sz="2800" b="1" dirty="0">
-              <a:solidFill>
-                <a:schemeClr val="bg1">
-                  <a:lumMod val="50000"/>
-                </a:schemeClr>
-              </a:solidFill>
-            </a:endParaRPr>
-          </a:p>
-          <a:p>
-            <a:r>
-              <a:rPr lang="de-DE" sz="2800" b="1" dirty="0">
-                <a:solidFill>
-                  <a:schemeClr val="bg1">
-                    <a:lumMod val="50000"/>
-                  </a:schemeClr>
-                </a:solidFill>
-              </a:rPr>
-              <a:t>-</a:t>
-            </a:r>
-            <a:r>
-              <a:rPr lang="de-DE" sz="2800" b="1" dirty="0" err="1">
-                <a:solidFill>
-                  <a:schemeClr val="bg1">
-                    <a:lumMod val="50000"/>
-                  </a:schemeClr>
-                </a:solidFill>
-              </a:rPr>
-              <a:t>git</a:t>
-            </a:r>
-            <a:r>
-              <a:rPr lang="de-DE" sz="2800" b="1" dirty="0">
-                <a:solidFill>
-                  <a:schemeClr val="bg1">
-                    <a:lumMod val="50000"/>
-                  </a:schemeClr>
-                </a:solidFill>
-              </a:rPr>
-              <a:t> pull</a:t>
-            </a:r>
-          </a:p>
-          <a:p>
-            <a:endParaRPr lang="de-DE" sz="2800" b="1" dirty="0">
-              <a:solidFill>
-                <a:schemeClr val="bg1">
-                  <a:lumMod val="50000"/>
-                </a:schemeClr>
-              </a:solidFill>
-            </a:endParaRPr>
-          </a:p>
-          <a:p>
-            <a:r>
-              <a:rPr lang="de-DE" sz="2800" b="1" dirty="0">
-                <a:solidFill>
-                  <a:schemeClr val="bg1">
-                    <a:lumMod val="50000"/>
-                  </a:schemeClr>
-                </a:solidFill>
-              </a:rPr>
-              <a:t>-</a:t>
-            </a:r>
-            <a:r>
-              <a:rPr lang="de-DE" sz="2800" b="1" dirty="0" err="1">
-                <a:solidFill>
-                  <a:schemeClr val="bg1">
-                    <a:lumMod val="50000"/>
-                  </a:schemeClr>
-                </a:solidFill>
-              </a:rPr>
-              <a:t>git</a:t>
-            </a:r>
-            <a:r>
-              <a:rPr lang="de-DE" sz="2800" b="1" dirty="0">
-                <a:solidFill>
-                  <a:schemeClr val="bg1">
-                    <a:lumMod val="50000"/>
-                  </a:schemeClr>
-                </a:solidFill>
-              </a:rPr>
-              <a:t> </a:t>
-            </a:r>
-            <a:r>
-              <a:rPr lang="de-DE" sz="2800" b="1" dirty="0" err="1">
-                <a:solidFill>
-                  <a:schemeClr val="bg1">
-                    <a:lumMod val="50000"/>
-                  </a:schemeClr>
-                </a:solidFill>
-              </a:rPr>
-              <a:t>clone</a:t>
-            </a:r>
-            <a:endParaRPr lang="de-DE" sz="2800" b="1" dirty="0">
-              <a:solidFill>
-                <a:schemeClr val="bg1">
-                  <a:lumMod val="50000"/>
-                </a:schemeClr>
-              </a:solidFill>
-            </a:endParaRPr>
           </a:p>
         </p:txBody>
       </p:sp>

</xml_diff>